<commit_message>
Add missing eventscenter in delete diagram
</commit_message>
<xml_diff>
--- a/docs/diagrams/Diagrams.pptx
+++ b/docs/diagrams/Diagrams.pptx
@@ -7478,8 +7478,8 @@
         </p:nvSpPr>
         <p:spPr>
           <a:xfrm>
-            <a:off x="4384723" y="5071221"/>
-            <a:ext cx="173786" cy="599252"/>
+            <a:off x="4384723" y="5071220"/>
+            <a:ext cx="173786" cy="872379"/>
           </a:xfrm>
           <a:prstGeom prst="rect">
             <a:avLst/>
@@ -21865,6 +21865,150 @@
           <a:chExt cx="0" cy="0"/>
         </a:xfrm>
       </p:grpSpPr>
+      <p:sp>
+        <p:nvSpPr>
+          <p:cNvPr id="71" name="Rounded Rectangle 61"/>
+          <p:cNvSpPr/>
+          <p:nvPr/>
+        </p:nvSpPr>
+        <p:spPr>
+          <a:xfrm>
+            <a:off x="0" y="3475534"/>
+            <a:ext cx="9144000" cy="3230066"/>
+          </a:xfrm>
+          <a:prstGeom prst="roundRect">
+            <a:avLst/>
+          </a:prstGeom>
+          <a:solidFill>
+            <a:schemeClr val="bg1"/>
+          </a:solidFill>
+        </p:spPr>
+        <p:style>
+          <a:lnRef idx="2">
+            <a:schemeClr val="accent1">
+              <a:shade val="50000"/>
+            </a:schemeClr>
+          </a:lnRef>
+          <a:fillRef idx="1">
+            <a:schemeClr val="accent1"/>
+          </a:fillRef>
+          <a:effectRef idx="0">
+            <a:schemeClr val="accent1"/>
+          </a:effectRef>
+          <a:fontRef idx="minor">
+            <a:schemeClr val="lt1"/>
+          </a:fontRef>
+        </p:style>
+        <p:txBody>
+          <a:bodyPr rtlCol="0" anchor="ctr"/>
+          <a:lstStyle/>
+          <a:p>
+            <a:pPr algn="ctr"/>
+            <a:endParaRPr lang="en-US"/>
+          </a:p>
+        </p:txBody>
+      </p:sp>
+      <p:sp>
+        <p:nvSpPr>
+          <p:cNvPr id="73" name="TextBox 62"/>
+          <p:cNvSpPr txBox="1"/>
+          <p:nvPr/>
+        </p:nvSpPr>
+        <p:spPr>
+          <a:xfrm>
+            <a:off x="194562" y="3737425"/>
+            <a:ext cx="799706" cy="369332"/>
+          </a:xfrm>
+          <a:prstGeom prst="rect">
+            <a:avLst/>
+          </a:prstGeom>
+          <a:noFill/>
+        </p:spPr>
+        <p:txBody>
+          <a:bodyPr wrap="none" rtlCol="0">
+            <a:spAutoFit/>
+          </a:bodyPr>
+          <a:lstStyle/>
+          <a:p>
+            <a:r>
+              <a:rPr lang="en-US" dirty="0"/>
+              <a:t>Delete</a:t>
+            </a:r>
+          </a:p>
+        </p:txBody>
+      </p:sp>
+      <p:sp>
+        <p:nvSpPr>
+          <p:cNvPr id="64" name="Rounded Rectangle 61"/>
+          <p:cNvSpPr/>
+          <p:nvPr/>
+        </p:nvSpPr>
+        <p:spPr>
+          <a:xfrm>
+            <a:off x="0" y="-271987"/>
+            <a:ext cx="9144000" cy="3552166"/>
+          </a:xfrm>
+          <a:prstGeom prst="roundRect">
+            <a:avLst/>
+          </a:prstGeom>
+          <a:solidFill>
+            <a:schemeClr val="bg1"/>
+          </a:solidFill>
+        </p:spPr>
+        <p:style>
+          <a:lnRef idx="2">
+            <a:schemeClr val="accent1">
+              <a:shade val="50000"/>
+            </a:schemeClr>
+          </a:lnRef>
+          <a:fillRef idx="1">
+            <a:schemeClr val="accent1"/>
+          </a:fillRef>
+          <a:effectRef idx="0">
+            <a:schemeClr val="accent1"/>
+          </a:effectRef>
+          <a:fontRef idx="minor">
+            <a:schemeClr val="lt1"/>
+          </a:fontRef>
+        </p:style>
+        <p:txBody>
+          <a:bodyPr rtlCol="0" anchor="ctr"/>
+          <a:lstStyle/>
+          <a:p>
+            <a:pPr algn="ctr"/>
+            <a:endParaRPr lang="en-US"/>
+          </a:p>
+        </p:txBody>
+      </p:sp>
+      <p:sp>
+        <p:nvSpPr>
+          <p:cNvPr id="65" name="TextBox 62"/>
+          <p:cNvSpPr txBox="1"/>
+          <p:nvPr/>
+        </p:nvSpPr>
+        <p:spPr>
+          <a:xfrm>
+            <a:off x="194562" y="-10096"/>
+            <a:ext cx="799706" cy="369332"/>
+          </a:xfrm>
+          <a:prstGeom prst="rect">
+            <a:avLst/>
+          </a:prstGeom>
+          <a:noFill/>
+        </p:spPr>
+        <p:txBody>
+          <a:bodyPr wrap="none" rtlCol="0">
+            <a:spAutoFit/>
+          </a:bodyPr>
+          <a:lstStyle/>
+          <a:p>
+            <a:r>
+              <a:rPr lang="en-US" dirty="0"/>
+              <a:t>Delete</a:t>
+            </a:r>
+          </a:p>
+        </p:txBody>
+      </p:sp>
       <p:sp>
         <p:nvSpPr>
           <p:cNvPr id="2" name="Rectangle 62"/>

</xml_diff>